<commit_message>
Added link to video demonstation in final powerpoint
</commit_message>
<xml_diff>
--- a/Presentations/FourthPresentation.pptx
+++ b/Presentations/FourthPresentation.pptx
@@ -117,6 +117,11 @@
       </a:defRPr>
     </a:lvl9pPr>
   </p:defaultTextStyle>
+  <p:extLst>
+    <p:ext uri="{EFAFB233-063F-42B5-8137-9DF3F51BA10A}">
+      <p15:sldGuideLst xmlns:p15="http://schemas.microsoft.com/office/powerpoint/2012/main"/>
+    </p:ext>
+  </p:extLst>
 </p:presentation>
 </file>
 
@@ -4296,13 +4301,8 @@
           <a:p>
             <a:r>
               <a:rPr lang="en-GB" sz="3600" u="sng" dirty="0"/>
-              <a:t>Gameplay </a:t>
-            </a:r>
-            <a:r>
-              <a:rPr lang="en-GB" sz="3600" u="sng" dirty="0" err="1"/>
-              <a:t>demonstation</a:t>
-            </a:r>
-            <a:endParaRPr lang="en-GB" sz="3600" u="sng" dirty="0"/>
+              <a:t>Gameplay demonstration</a:t>
+            </a:r>
           </a:p>
         </p:txBody>
       </p:sp>
@@ -4327,9 +4327,12 @@
           <a:lstStyle/>
           <a:p>
             <a:r>
-              <a:rPr lang="en-GB" dirty="0"/>
-              <a:t>[Video]</a:t>
-            </a:r>
+              <a:rPr lang="en-GB" dirty="0">
+                <a:hlinkClick r:id="rId2"/>
+              </a:rPr>
+              <a:t>https://www.youtube.com/watch?v=7AnleoJ-JZY&amp;feature=youtu.be</a:t>
+            </a:r>
+            <a:endParaRPr lang="en-GB" dirty="0"/>
           </a:p>
         </p:txBody>
       </p:sp>

</xml_diff>